<commit_message>
Design van affiche beginnen
</commit_message>
<xml_diff>
--- a/Documenten/AfficheSecurity.pptx
+++ b/Documenten/AfficheSecurity.pptx
@@ -118,7 +118,7 @@
 <file path=ppt/revisionInfo.xml><?xml version="1.0" encoding="utf-8"?>
 <p1510:revInfo xmlns:a="http://schemas.openxmlformats.org/drawingml/2006/main" xmlns:r="http://schemas.openxmlformats.org/officeDocument/2006/relationships" xmlns:p1510="http://schemas.microsoft.com/office/powerpoint/2015/10/main">
   <p1510:revLst>
-    <p1510:client id="{C4FED9F4-1C3F-4FB5-98AB-9D7C96A49125}" v="2" dt="2024-08-20T09:08:00.328"/>
+    <p1510:client id="{5BA0989C-D548-AA47-9D08-57BFD677D8E4}" v="2" dt="2024-11-07T10:24:19.463"/>
   </p1510:revLst>
 </p1510:revInfo>
 </file>
@@ -220,6 +220,70 @@
         </pc:spChg>
         <pc:picChg chg="mod">
           <ac:chgData name="Mathieu Leroy" userId="08ea5e48-81be-492f-a7c6-c75dd17a45b1" providerId="ADAL" clId="{152AAC23-DBA4-4958-9A26-CD153ABA8D57}" dt="2023-09-18T13:05:07.872" v="30" actId="14100"/>
+          <ac:picMkLst>
+            <pc:docMk/>
+            <pc:sldMk cId="605389948" sldId="259"/>
+            <ac:picMk id="42" creationId="{46565EF2-5F1F-216A-A7BE-591F9ED27A6C}"/>
+          </ac:picMkLst>
+        </pc:picChg>
+      </pc:sldChg>
+    </pc:docChg>
+  </pc:docChgLst>
+  <pc:docChgLst>
+    <pc:chgData name="Luca De Clerck" userId="07f8217f-eef7-4636-9398-e488efa9f7b4" providerId="ADAL" clId="{5BA0989C-D548-AA47-9D08-57BFD677D8E4}"/>
+    <pc:docChg chg="undo custSel modSld">
+      <pc:chgData name="Luca De Clerck" userId="07f8217f-eef7-4636-9398-e488efa9f7b4" providerId="ADAL" clId="{5BA0989C-D548-AA47-9D08-57BFD677D8E4}" dt="2024-11-07T10:26:07.307" v="844" actId="20577"/>
+      <pc:docMkLst>
+        <pc:docMk/>
+      </pc:docMkLst>
+      <pc:sldChg chg="addSp delSp modSp mod">
+        <pc:chgData name="Luca De Clerck" userId="07f8217f-eef7-4636-9398-e488efa9f7b4" providerId="ADAL" clId="{5BA0989C-D548-AA47-9D08-57BFD677D8E4}" dt="2024-11-07T10:26:07.307" v="844" actId="20577"/>
+        <pc:sldMkLst>
+          <pc:docMk/>
+          <pc:sldMk cId="605389948" sldId="259"/>
+        </pc:sldMkLst>
+        <pc:spChg chg="mod">
+          <ac:chgData name="Luca De Clerck" userId="07f8217f-eef7-4636-9398-e488efa9f7b4" providerId="ADAL" clId="{5BA0989C-D548-AA47-9D08-57BFD677D8E4}" dt="2024-11-07T10:23:11.518" v="519" actId="20577"/>
+          <ac:spMkLst>
+            <pc:docMk/>
+            <pc:sldMk cId="605389948" sldId="259"/>
+            <ac:spMk id="2" creationId="{E5D1BB34-8DFD-1A6C-46EE-D709F1A2E3EE}"/>
+          </ac:spMkLst>
+        </pc:spChg>
+        <pc:spChg chg="mod">
+          <ac:chgData name="Luca De Clerck" userId="07f8217f-eef7-4636-9398-e488efa9f7b4" providerId="ADAL" clId="{5BA0989C-D548-AA47-9D08-57BFD677D8E4}" dt="2024-11-07T10:06:42.153" v="480" actId="20577"/>
+          <ac:spMkLst>
+            <pc:docMk/>
+            <pc:sldMk cId="605389948" sldId="259"/>
+            <ac:spMk id="3" creationId="{C9484A38-808E-49C3-AC6A-5F38EC734FFE}"/>
+          </ac:spMkLst>
+        </pc:spChg>
+        <pc:spChg chg="mod">
+          <ac:chgData name="Luca De Clerck" userId="07f8217f-eef7-4636-9398-e488efa9f7b4" providerId="ADAL" clId="{5BA0989C-D548-AA47-9D08-57BFD677D8E4}" dt="2024-11-07T09:44:39.284" v="35" actId="1076"/>
+          <ac:spMkLst>
+            <pc:docMk/>
+            <pc:sldMk cId="605389948" sldId="259"/>
+            <ac:spMk id="32" creationId="{393167BD-734E-F686-52B8-C19524E9CA4E}"/>
+          </ac:spMkLst>
+        </pc:spChg>
+        <pc:spChg chg="mod">
+          <ac:chgData name="Luca De Clerck" userId="07f8217f-eef7-4636-9398-e488efa9f7b4" providerId="ADAL" clId="{5BA0989C-D548-AA47-9D08-57BFD677D8E4}" dt="2024-11-07T10:26:07.307" v="844" actId="20577"/>
+          <ac:spMkLst>
+            <pc:docMk/>
+            <pc:sldMk cId="605389948" sldId="259"/>
+            <ac:spMk id="38" creationId="{BF453FA0-7C61-6C1A-4866-179843F539E5}"/>
+          </ac:spMkLst>
+        </pc:spChg>
+        <pc:picChg chg="add mod modCrop">
+          <ac:chgData name="Luca De Clerck" userId="07f8217f-eef7-4636-9398-e488efa9f7b4" providerId="ADAL" clId="{5BA0989C-D548-AA47-9D08-57BFD677D8E4}" dt="2024-11-07T10:24:19.463" v="629" actId="167"/>
+          <ac:picMkLst>
+            <pc:docMk/>
+            <pc:sldMk cId="605389948" sldId="259"/>
+            <ac:picMk id="4" creationId="{C1C035A4-F84F-8A91-4A81-8EE82EF97C09}"/>
+          </ac:picMkLst>
+        </pc:picChg>
+        <pc:picChg chg="add del">
+          <ac:chgData name="Luca De Clerck" userId="07f8217f-eef7-4636-9398-e488efa9f7b4" providerId="ADAL" clId="{5BA0989C-D548-AA47-9D08-57BFD677D8E4}" dt="2024-11-07T09:58:43.530" v="55" actId="478"/>
           <ac:picMkLst>
             <pc:docMk/>
             <pc:sldMk cId="605389948" sldId="259"/>
@@ -450,7 +514,7 @@
           <a:p>
             <a:fld id="{CDF7AF62-86D8-402D-B735-90423DD750BA}" type="datetimeFigureOut">
               <a:rPr lang="nl-BE" smtClean="0"/>
-              <a:t>20/08/2024</a:t>
+              <a:t>7/11/2024</a:t>
             </a:fld>
             <a:endParaRPr lang="nl-BE"/>
           </a:p>
@@ -609,7 +673,7 @@
           <a:p>
             <a:fld id="{855C978A-CD55-4F19-93E8-BF36DF9A91D6}" type="slidenum">
               <a:rPr lang="nl-BE" smtClean="0"/>
-              <a:t>‹nr.›</a:t>
+              <a:t>‹#›</a:t>
             </a:fld>
             <a:endParaRPr lang="nl-BE"/>
           </a:p>
@@ -1194,6 +1258,35 @@
           <a:chExt cx="0" cy="0"/>
         </a:xfrm>
       </p:grpSpPr>
+      <p:pic>
+        <p:nvPicPr>
+          <p:cNvPr id="4" name="Picture 3">
+            <a:extLst>
+              <a:ext uri="{FF2B5EF4-FFF2-40B4-BE49-F238E27FC236}">
+                <a16:creationId xmlns:a16="http://schemas.microsoft.com/office/drawing/2014/main" id="{C1C035A4-F84F-8A91-4A81-8EE82EF97C09}"/>
+              </a:ext>
+            </a:extLst>
+          </p:cNvPr>
+          <p:cNvPicPr>
+            <a:picLocks noChangeAspect="1"/>
+          </p:cNvPicPr>
+          <p:nvPr/>
+        </p:nvPicPr>
+        <p:blipFill>
+          <a:blip r:embed="rId2"/>
+          <a:srcRect l="5711" t="3934" r="6178" b="26695"/>
+          <a:stretch/>
+        </p:blipFill>
+        <p:spPr>
+          <a:xfrm>
+            <a:off x="25193261" y="38216758"/>
+            <a:ext cx="4298950" cy="4386395"/>
+          </a:xfrm>
+          <a:prstGeom prst="rect">
+            <a:avLst/>
+          </a:prstGeom>
+        </p:spPr>
+      </p:pic>
       <p:sp>
         <p:nvSpPr>
           <p:cNvPr id="32" name="Rechthoek 31">
@@ -1274,8 +1367,8 @@
         </p:nvSpPr>
         <p:spPr>
           <a:xfrm>
-            <a:off x="2101090" y="6930189"/>
-            <a:ext cx="10569198" cy="15257987"/>
+            <a:off x="1324339" y="6930189"/>
+            <a:ext cx="13099585" cy="15257987"/>
           </a:xfrm>
         </p:spPr>
         <p:txBody>
@@ -1291,7 +1384,7 @@
             </a:pPr>
             <a:r>
               <a:rPr lang="nl-BE" dirty="0"/>
-              <a:t>Project titel</a:t>
+              <a:t>Greenhouse Security</a:t>
             </a:r>
             <a:br>
               <a:rPr lang="nl-BE" dirty="0">
@@ -1311,12 +1404,12 @@
               </a:rPr>
             </a:br>
             <a:r>
-              <a:rPr lang="nl-BE" sz="6000" dirty="0">
+              <a:rPr lang="nl-BE" sz="4800" dirty="0">
                 <a:solidFill>
                   <a:srgbClr val="E00020"/>
                 </a:solidFill>
               </a:rPr>
-              <a:t>Subtitel</a:t>
+              <a:t>Veiligheid voor elke groene meter</a:t>
             </a:r>
             <a:br>
               <a:rPr lang="nl-BE" sz="6000" dirty="0">
@@ -1347,8 +1440,80 @@
                   </a:schemeClr>
                 </a:solidFill>
               </a:rPr>
-              <a:t>Omschrijving van de casus en jullie uitwerking, gebruikte leerstof en componenten.</a:t>
-            </a:r>
+              <a:t>Op de site campus Brugge Xavarianenstraat komt een serre van 3x6m te staa,. Daarbij komt later ook nog een Tiny-house. Dit alles als IoT incubator voor project experience. Ons project zal zorgen voor de security en beveiliging van de serre. We maken hiervoor gebruik van bewakings camera's en een toegangs controle systeem.</a:t>
+            </a:r>
+            <a:br>
+              <a:rPr lang="nl-BE" sz="3000" dirty="0">
+                <a:solidFill>
+                  <a:schemeClr val="accent6">
+                    <a:lumMod val="60000"/>
+                    <a:lumOff val="40000"/>
+                  </a:schemeClr>
+                </a:solidFill>
+              </a:rPr>
+            </a:br>
+            <a:br>
+              <a:rPr lang="nl-BE" sz="3000" dirty="0">
+                <a:solidFill>
+                  <a:schemeClr val="accent6">
+                    <a:lumMod val="60000"/>
+                    <a:lumOff val="40000"/>
+                  </a:schemeClr>
+                </a:solidFill>
+              </a:rPr>
+            </a:br>
+            <a:r>
+              <a:rPr lang="nl-BE" sz="3000" dirty="0">
+                <a:solidFill>
+                  <a:schemeClr val="accent6">
+                    <a:lumMod val="60000"/>
+                    <a:lumOff val="40000"/>
+                  </a:schemeClr>
+                </a:solidFill>
+              </a:rPr>
+              <a:t>Ons project, Greenhouse Security, richt zich op de beveiliging van deze serre. We maken gebruik van slimme beveiligingscamera's en een toegangssysteem om een veilige omgeving te waarborgen. De slimme camera’s stellen ons in staat om 24/7 toezicht te houden en direct beelden vast te leggen bij ongewenst bezoek.</a:t>
+            </a:r>
+            <a:br>
+              <a:rPr lang="nl-BE" sz="3000" dirty="0">
+                <a:solidFill>
+                  <a:schemeClr val="accent6">
+                    <a:lumMod val="60000"/>
+                    <a:lumOff val="40000"/>
+                  </a:schemeClr>
+                </a:solidFill>
+              </a:rPr>
+            </a:br>
+            <a:br>
+              <a:rPr lang="nl-BE" sz="3000" dirty="0">
+                <a:solidFill>
+                  <a:schemeClr val="accent6">
+                    <a:lumMod val="60000"/>
+                    <a:lumOff val="40000"/>
+                  </a:schemeClr>
+                </a:solidFill>
+              </a:rPr>
+            </a:br>
+            <a:r>
+              <a:rPr lang="nl-BE" sz="3000" dirty="0">
+                <a:solidFill>
+                  <a:schemeClr val="accent6">
+                    <a:lumMod val="60000"/>
+                    <a:lumOff val="40000"/>
+                  </a:schemeClr>
+                </a:solidFill>
+              </a:rPr>
+              <a:t>Daarnaast implementeren we een geavanceerd toegangscontrolesysteem, zodat alleen geautoriseerd personeel toegang krijgt tot de serre. Op deze manier creëren we een veilige en gecontroleerde ruimte voor iedereen die met het IoT-incubatorproject aan de slag gaat.</a:t>
+            </a:r>
+            <a:br>
+              <a:rPr lang="nl-BE" sz="3000" dirty="0">
+                <a:solidFill>
+                  <a:schemeClr val="accent6">
+                    <a:lumMod val="60000"/>
+                    <a:lumOff val="40000"/>
+                  </a:schemeClr>
+                </a:solidFill>
+              </a:rPr>
+            </a:br>
             <a:endParaRPr lang="nl-BE" dirty="0">
               <a:solidFill>
                 <a:schemeClr val="accent6">
@@ -1503,7 +1668,7 @@
           <a:lstStyle/>
           <a:p>
             <a:r>
-              <a:rPr lang="nl-BE" sz="6000">
+              <a:rPr lang="nl-BE" sz="6000" dirty="0">
                 <a:solidFill>
                   <a:srgbClr val="E00020"/>
                 </a:solidFill>
@@ -1513,7 +1678,7 @@
           </a:p>
           <a:p>
             <a:r>
-              <a:rPr lang="nl-BE" sz="6000">
+              <a:rPr lang="nl-BE" sz="6000" dirty="0">
                 <a:solidFill>
                   <a:srgbClr val="E00020"/>
                 </a:solidFill>
@@ -1537,8 +1702,8 @@
         </p:nvSpPr>
         <p:spPr>
           <a:xfrm>
-            <a:off x="16392626" y="38978795"/>
-            <a:ext cx="4766882" cy="2862322"/>
+            <a:off x="15408274" y="38978794"/>
+            <a:ext cx="9611862" cy="1938992"/>
           </a:xfrm>
           <a:prstGeom prst="rect">
             <a:avLst/>
@@ -1552,7 +1717,7 @@
           <a:lstStyle/>
           <a:p>
             <a:r>
-              <a:rPr lang="nl-BE" sz="3000" b="1">
+              <a:rPr lang="nl-BE" sz="3000" b="1" dirty="0">
                 <a:solidFill>
                   <a:srgbClr val="E00020"/>
                 </a:solidFill>
@@ -1566,8 +1731,16 @@
               <a:buChar char="•"/>
             </a:pPr>
             <a:r>
-              <a:rPr lang="nl-BE" sz="3000"/>
-              <a:t>Student 1, jaar en richting</a:t>
+              <a:rPr lang="nl-BE" sz="3000" dirty="0"/>
+              <a:t>Xander Claessens, 3</a:t>
+            </a:r>
+            <a:r>
+              <a:rPr lang="nl-BE" sz="3000" baseline="30000" dirty="0"/>
+              <a:t>e</a:t>
+            </a:r>
+            <a:r>
+              <a:rPr lang="nl-BE" sz="3000" dirty="0"/>
+              <a:t> jaar – Netwerken &amp; System Admin</a:t>
             </a:r>
           </a:p>
           <a:p>
@@ -1576,8 +1749,16 @@
               <a:buChar char="•"/>
             </a:pPr>
             <a:r>
-              <a:rPr lang="nl-BE" sz="3000"/>
-              <a:t>Student 2 , jaar en richting</a:t>
+              <a:rPr lang="nl-BE" sz="3000" dirty="0"/>
+              <a:t>Luca De Clerck, 3</a:t>
+            </a:r>
+            <a:r>
+              <a:rPr lang="nl-BE" sz="3000" baseline="30000" dirty="0"/>
+              <a:t>e</a:t>
+            </a:r>
+            <a:r>
+              <a:rPr lang="nl-BE" sz="3000" dirty="0"/>
+              <a:t> jaar – Netwerken &amp; System Admin</a:t>
             </a:r>
           </a:p>
           <a:p>
@@ -1586,62 +1767,20 @@
               <a:buChar char="•"/>
             </a:pPr>
             <a:r>
-              <a:rPr lang="nl-BE" sz="3000"/>
-              <a:t>Student 3 , jaar en richting</a:t>
-            </a:r>
-          </a:p>
-          <a:p>
-            <a:pPr marL="457200" indent="-457200">
-              <a:buFont typeface="Arial" panose="020B0604020202020204" pitchFamily="34" charset="0"/>
-              <a:buChar char="•"/>
-            </a:pPr>
-            <a:r>
-              <a:rPr lang="nl-BE" sz="3000"/>
-              <a:t>Student 4 , jaar en richting</a:t>
-            </a:r>
-          </a:p>
-          <a:p>
-            <a:pPr marL="457200" indent="-457200">
-              <a:buFont typeface="Arial" panose="020B0604020202020204" pitchFamily="34" charset="0"/>
-              <a:buChar char="•"/>
-            </a:pPr>
-            <a:r>
-              <a:rPr lang="nl-BE" sz="3000"/>
-              <a:t>Student 5 , jaar en richting</a:t>
+              <a:rPr lang="nl-BE" sz="3000" dirty="0"/>
+              <a:t>Domien Verstraete, 3</a:t>
+            </a:r>
+            <a:r>
+              <a:rPr lang="nl-BE" sz="3000" baseline="30000" dirty="0"/>
+              <a:t>e</a:t>
+            </a:r>
+            <a:r>
+              <a:rPr lang="nl-BE" sz="3000" dirty="0"/>
+              <a:t> jaar – Netwerken &amp; System Admin</a:t>
             </a:r>
           </a:p>
         </p:txBody>
       </p:sp>
-      <p:pic>
-        <p:nvPicPr>
-          <p:cNvPr id="42" name="Afbeelding 41">
-            <a:extLst>
-              <a:ext uri="{FF2B5EF4-FFF2-40B4-BE49-F238E27FC236}">
-                <a16:creationId xmlns:a16="http://schemas.microsoft.com/office/drawing/2014/main" id="{46565EF2-5F1F-216A-A7BE-591F9ED27A6C}"/>
-              </a:ext>
-            </a:extLst>
-          </p:cNvPr>
-          <p:cNvPicPr>
-            <a:picLocks noChangeAspect="1"/>
-          </p:cNvPicPr>
-          <p:nvPr/>
-        </p:nvPicPr>
-        <p:blipFill>
-          <a:blip r:embed="rId2"/>
-          <a:stretch>
-            <a:fillRect/>
-          </a:stretch>
-        </p:blipFill>
-        <p:spPr>
-          <a:xfrm>
-            <a:off x="25868671" y="38340118"/>
-            <a:ext cx="3946043" cy="3974534"/>
-          </a:xfrm>
-          <a:prstGeom prst="rect">
-            <a:avLst/>
-          </a:prstGeom>
-        </p:spPr>
-      </p:pic>
       <p:sp>
         <p:nvSpPr>
           <p:cNvPr id="45" name="Rechthoek 44" descr="Camera met effen opvulling">
@@ -2102,7 +2241,7 @@
         <p:spPr>
           <a:xfrm>
             <a:off x="2937394" y="30450961"/>
-            <a:ext cx="8549135" cy="5078313"/>
+            <a:ext cx="8549135" cy="5632311"/>
           </a:xfrm>
           <a:prstGeom prst="rect">
             <a:avLst/>
@@ -2226,10 +2365,6 @@
             </a:endParaRPr>
           </a:p>
           <a:p>
-            <a:pPr marL="457200" indent="-457200">
-              <a:buFont typeface="Wingdings" panose="05000000000000000000" pitchFamily="2" charset="2"/>
-              <a:buChar char="þ"/>
-            </a:pPr>
             <a:r>
               <a:rPr lang="en-GB" sz="3600" dirty="0">
                 <a:solidFill>
@@ -2242,14 +2377,10 @@
                 <a:ea typeface="Segoe UI Black" panose="020B0A02040204020203" pitchFamily="34" charset="0"/>
                 <a:cs typeface="+mj-cs"/>
               </a:rPr>
-              <a:t>Artificial Intelligence</a:t>
-            </a:r>
-          </a:p>
-          <a:p>
-            <a:pPr marL="457200" indent="-457200">
-              <a:buFont typeface="Wingdings" panose="05000000000000000000" pitchFamily="2" charset="2"/>
-              <a:buChar char="þ"/>
-            </a:pPr>
+              <a:t> Artificial Intelligence</a:t>
+            </a:r>
+          </a:p>
+          <a:p>
             <a:endParaRPr lang="en-GB" sz="3600" dirty="0">
               <a:solidFill>
                 <a:schemeClr val="accent6">
@@ -2281,6 +2412,19 @@
               </a:rPr>
               <a:t>Personal development</a:t>
             </a:r>
+          </a:p>
+          <a:p>
+            <a:endParaRPr lang="en-GB" sz="3600" dirty="0">
+              <a:solidFill>
+                <a:schemeClr val="accent6">
+                  <a:lumMod val="60000"/>
+                  <a:lumOff val="40000"/>
+                </a:schemeClr>
+              </a:solidFill>
+              <a:latin typeface="Segoe UI Black" panose="020B0A02040204020203" pitchFamily="34" charset="0"/>
+              <a:ea typeface="Segoe UI Black" panose="020B0A02040204020203" pitchFamily="34" charset="0"/>
+              <a:cs typeface="+mj-cs"/>
+            </a:endParaRPr>
           </a:p>
         </p:txBody>
       </p:sp>
@@ -3001,15 +3145,6 @@
 </file>
 
 <file path=customXml/item2.xml><?xml version="1.0" encoding="utf-8"?>
-<?mso-contentType ?>
-<FormTemplates xmlns="http://schemas.microsoft.com/sharepoint/v3/contenttype/forms">
-  <Display>DocumentLibraryForm</Display>
-  <Edit>DocumentLibraryForm</Edit>
-  <New>DocumentLibraryForm</New>
-</FormTemplates>
-</file>
-
-<file path=customXml/item3.xml><?xml version="1.0" encoding="utf-8"?>
 <p:properties xmlns:p="http://schemas.microsoft.com/office/2006/metadata/properties" xmlns:xsi="http://www.w3.org/2001/XMLSchema-instance" xmlns:pc="http://schemas.microsoft.com/office/infopath/2007/PartnerControls">
   <documentManagement>
     <TaxCatchAll xmlns="f921bb7d-4033-42bd-968a-881fd459c073" xsi:nil="true"/>
@@ -3018,6 +3153,15 @@
     </lcf76f155ced4ddcb4097134ff3c332f>
   </documentManagement>
 </p:properties>
+</file>
+
+<file path=customXml/item3.xml><?xml version="1.0" encoding="utf-8"?>
+<?mso-contentType ?>
+<FormTemplates xmlns="http://schemas.microsoft.com/sharepoint/v3/contenttype/forms">
+  <Display>DocumentLibraryForm</Display>
+  <Edit>DocumentLibraryForm</Edit>
+  <New>DocumentLibraryForm</New>
+</FormTemplates>
 </file>
 
 <file path=customXml/itemProps1.xml><?xml version="1.0" encoding="utf-8"?>
@@ -3040,26 +3184,26 @@
 </file>
 
 <file path=customXml/itemProps2.xml><?xml version="1.0" encoding="utf-8"?>
+<ds:datastoreItem xmlns:ds="http://schemas.openxmlformats.org/officeDocument/2006/customXml" ds:itemID="{B247EB90-66CA-4409-98FF-5024AA619E64}">
+  <ds:schemaRefs>
+    <ds:schemaRef ds:uri="http://schemas.microsoft.com/office/2006/documentManagement/types"/>
+    <ds:schemaRef ds:uri="http://purl.org/dc/elements/1.1/"/>
+    <ds:schemaRef ds:uri="f921bb7d-4033-42bd-968a-881fd459c073"/>
+    <ds:schemaRef ds:uri="http://schemas.microsoft.com/office/infopath/2007/PartnerControls"/>
+    <ds:schemaRef ds:uri="http://purl.org/dc/dcmitype/"/>
+    <ds:schemaRef ds:uri="http://schemas.openxmlformats.org/package/2006/metadata/core-properties"/>
+    <ds:schemaRef ds:uri="7af3f08f-6b65-4c98-b033-853692dc00be"/>
+    <ds:schemaRef ds:uri="http://schemas.microsoft.com/office/2006/metadata/properties"/>
+    <ds:schemaRef ds:uri="http://www.w3.org/XML/1998/namespace"/>
+    <ds:schemaRef ds:uri="http://purl.org/dc/terms/"/>
+  </ds:schemaRefs>
+</ds:datastoreItem>
+</file>
+
+<file path=customXml/itemProps3.xml><?xml version="1.0" encoding="utf-8"?>
 <ds:datastoreItem xmlns:ds="http://schemas.openxmlformats.org/officeDocument/2006/customXml" ds:itemID="{E1FA04DA-A2C1-4A00-9FA4-1F6991DECE56}">
   <ds:schemaRefs>
     <ds:schemaRef ds:uri="http://schemas.microsoft.com/sharepoint/v3/contenttype/forms"/>
   </ds:schemaRefs>
 </ds:datastoreItem>
-</file>
-
-<file path=customXml/itemProps3.xml><?xml version="1.0" encoding="utf-8"?>
-<ds:datastoreItem xmlns:ds="http://schemas.openxmlformats.org/officeDocument/2006/customXml" ds:itemID="{B247EB90-66CA-4409-98FF-5024AA619E64}">
-  <ds:schemaRefs>
-    <ds:schemaRef ds:uri="7af3f08f-6b65-4c98-b033-853692dc00be"/>
-    <ds:schemaRef ds:uri="f921bb7d-4033-42bd-968a-881fd459c073"/>
-    <ds:schemaRef ds:uri="http://purl.org/dc/dcmitype/"/>
-    <ds:schemaRef ds:uri="http://purl.org/dc/elements/1.1/"/>
-    <ds:schemaRef ds:uri="http://purl.org/dc/terms/"/>
-    <ds:schemaRef ds:uri="http://schemas.microsoft.com/office/2006/documentManagement/types"/>
-    <ds:schemaRef ds:uri="http://schemas.microsoft.com/office/2006/metadata/properties"/>
-    <ds:schemaRef ds:uri="http://schemas.microsoft.com/office/infopath/2007/PartnerControls"/>
-    <ds:schemaRef ds:uri="http://schemas.openxmlformats.org/package/2006/metadata/core-properties"/>
-    <ds:schemaRef ds:uri="http://www.w3.org/XML/1998/namespace"/>
-  </ds:schemaRefs>
-</ds:datastoreItem>
 </file>
</xml_diff>